<commit_message>
draft of perspective sections
</commit_message>
<xml_diff>
--- a/e2e/figures/rpc.pptx
+++ b/e2e/figures/rpc.pptx
@@ -7,6 +7,7 @@
   <p:sldIdLst>
     <p:sldId id="258" r:id="rId2"/>
     <p:sldId id="257" r:id="rId3"/>
+    <p:sldId id="261" r:id="rId4"/>
   </p:sldIdLst>
   <p:sldSz cx="12192000" cy="6858000"/>
   <p:notesSz cx="6858000" cy="9144000"/>
@@ -244,7 +245,7 @@
           <a:p>
             <a:fld id="{5D97E163-DB95-D24D-8C95-263DECB1FC34}" type="datetimeFigureOut">
               <a:rPr lang="en-US" smtClean="0"/>
-              <a:t>2/1/19</a:t>
+              <a:t>3/25/19</a:t>
             </a:fld>
             <a:endParaRPr lang="en-US"/>
           </a:p>
@@ -414,7 +415,7 @@
           <a:p>
             <a:fld id="{5D97E163-DB95-D24D-8C95-263DECB1FC34}" type="datetimeFigureOut">
               <a:rPr lang="en-US" smtClean="0"/>
-              <a:t>2/1/19</a:t>
+              <a:t>3/25/19</a:t>
             </a:fld>
             <a:endParaRPr lang="en-US"/>
           </a:p>
@@ -594,7 +595,7 @@
           <a:p>
             <a:fld id="{5D97E163-DB95-D24D-8C95-263DECB1FC34}" type="datetimeFigureOut">
               <a:rPr lang="en-US" smtClean="0"/>
-              <a:t>2/1/19</a:t>
+              <a:t>3/25/19</a:t>
             </a:fld>
             <a:endParaRPr lang="en-US"/>
           </a:p>
@@ -764,7 +765,7 @@
           <a:p>
             <a:fld id="{5D97E163-DB95-D24D-8C95-263DECB1FC34}" type="datetimeFigureOut">
               <a:rPr lang="en-US" smtClean="0"/>
-              <a:t>2/1/19</a:t>
+              <a:t>3/25/19</a:t>
             </a:fld>
             <a:endParaRPr lang="en-US"/>
           </a:p>
@@ -1010,7 +1011,7 @@
           <a:p>
             <a:fld id="{5D97E163-DB95-D24D-8C95-263DECB1FC34}" type="datetimeFigureOut">
               <a:rPr lang="en-US" smtClean="0"/>
-              <a:t>2/1/19</a:t>
+              <a:t>3/25/19</a:t>
             </a:fld>
             <a:endParaRPr lang="en-US"/>
           </a:p>
@@ -1242,7 +1243,7 @@
           <a:p>
             <a:fld id="{5D97E163-DB95-D24D-8C95-263DECB1FC34}" type="datetimeFigureOut">
               <a:rPr lang="en-US" smtClean="0"/>
-              <a:t>2/1/19</a:t>
+              <a:t>3/25/19</a:t>
             </a:fld>
             <a:endParaRPr lang="en-US"/>
           </a:p>
@@ -1609,7 +1610,7 @@
           <a:p>
             <a:fld id="{5D97E163-DB95-D24D-8C95-263DECB1FC34}" type="datetimeFigureOut">
               <a:rPr lang="en-US" smtClean="0"/>
-              <a:t>2/1/19</a:t>
+              <a:t>3/25/19</a:t>
             </a:fld>
             <a:endParaRPr lang="en-US"/>
           </a:p>
@@ -1727,7 +1728,7 @@
           <a:p>
             <a:fld id="{5D97E163-DB95-D24D-8C95-263DECB1FC34}" type="datetimeFigureOut">
               <a:rPr lang="en-US" smtClean="0"/>
-              <a:t>2/1/19</a:t>
+              <a:t>3/25/19</a:t>
             </a:fld>
             <a:endParaRPr lang="en-US"/>
           </a:p>
@@ -1822,7 +1823,7 @@
           <a:p>
             <a:fld id="{5D97E163-DB95-D24D-8C95-263DECB1FC34}" type="datetimeFigureOut">
               <a:rPr lang="en-US" smtClean="0"/>
-              <a:t>2/1/19</a:t>
+              <a:t>3/25/19</a:t>
             </a:fld>
             <a:endParaRPr lang="en-US"/>
           </a:p>
@@ -2099,7 +2100,7 @@
           <a:p>
             <a:fld id="{5D97E163-DB95-D24D-8C95-263DECB1FC34}" type="datetimeFigureOut">
               <a:rPr lang="en-US" smtClean="0"/>
-              <a:t>2/1/19</a:t>
+              <a:t>3/25/19</a:t>
             </a:fld>
             <a:endParaRPr lang="en-US"/>
           </a:p>
@@ -2352,7 +2353,7 @@
           <a:p>
             <a:fld id="{5D97E163-DB95-D24D-8C95-263DECB1FC34}" type="datetimeFigureOut">
               <a:rPr lang="en-US" smtClean="0"/>
-              <a:t>2/1/19</a:t>
+              <a:t>3/25/19</a:t>
             </a:fld>
             <a:endParaRPr lang="en-US"/>
           </a:p>
@@ -2565,7 +2566,7 @@
           <a:p>
             <a:fld id="{5D97E163-DB95-D24D-8C95-263DECB1FC34}" type="datetimeFigureOut">
               <a:rPr lang="en-US" smtClean="0"/>
-              <a:t>2/1/19</a:t>
+              <a:t>3/25/19</a:t>
             </a:fld>
             <a:endParaRPr lang="en-US"/>
           </a:p>
@@ -4459,11 +4460,7 @@
           <a:p>
             <a:r>
               <a:rPr lang="en-US" sz="2400" dirty="0" smtClean="0"/>
-              <a:t>Generic</a:t>
-            </a:r>
-            <a:r>
-              <a:rPr lang="en-US" sz="2400" dirty="0" smtClean="0"/>
-              <a:t> </a:t>
+              <a:t>Generic </a:t>
             </a:r>
           </a:p>
           <a:p>
@@ -4528,6 +4525,961 @@
       </p:par>
     </p:tnLst>
   </p:timing>
+</p:sld>
+</file>
+
+<file path=ppt/slides/slide3.xml><?xml version="1.0" encoding="utf-8"?>
+<p:sld xmlns:a="http://schemas.openxmlformats.org/drawingml/2006/main" xmlns:r="http://schemas.openxmlformats.org/officeDocument/2006/relationships" xmlns:p="http://schemas.openxmlformats.org/presentationml/2006/main">
+  <p:cSld>
+    <p:spTree>
+      <p:nvGrpSpPr>
+        <p:cNvPr id="1" name=""/>
+        <p:cNvGrpSpPr/>
+        <p:nvPr/>
+      </p:nvGrpSpPr>
+      <p:grpSpPr>
+        <a:xfrm>
+          <a:off x="0" y="0"/>
+          <a:ext cx="0" cy="0"/>
+          <a:chOff x="0" y="0"/>
+          <a:chExt cx="0" cy="0"/>
+        </a:xfrm>
+      </p:grpSpPr>
+      <p:grpSp>
+        <p:nvGrpSpPr>
+          <p:cNvPr id="44" name="Group 43"/>
+          <p:cNvGrpSpPr/>
+          <p:nvPr/>
+        </p:nvGrpSpPr>
+        <p:grpSpPr>
+          <a:xfrm>
+            <a:off x="6685108" y="1324046"/>
+            <a:ext cx="3586714" cy="4299662"/>
+            <a:chOff x="8038000" y="1321760"/>
+            <a:chExt cx="3586714" cy="4299662"/>
+          </a:xfrm>
+        </p:grpSpPr>
+        <p:sp>
+          <p:nvSpPr>
+            <p:cNvPr id="7" name="Rectangle 6"/>
+            <p:cNvSpPr/>
+            <p:nvPr/>
+          </p:nvSpPr>
+          <p:spPr>
+            <a:xfrm>
+              <a:off x="9102607" y="3945194"/>
+              <a:ext cx="1460358" cy="482120"/>
+            </a:xfrm>
+            <a:prstGeom prst="rect">
+              <a:avLst/>
+            </a:prstGeom>
+            <a:solidFill>
+              <a:srgbClr val="CFE7F1"/>
+            </a:solidFill>
+            <a:ln w="57150">
+              <a:solidFill>
+                <a:srgbClr val="00B0F0"/>
+              </a:solidFill>
+            </a:ln>
+          </p:spPr>
+          <p:style>
+            <a:lnRef idx="2">
+              <a:schemeClr val="accent1">
+                <a:shade val="50000"/>
+              </a:schemeClr>
+            </a:lnRef>
+            <a:fillRef idx="1">
+              <a:schemeClr val="accent1"/>
+            </a:fillRef>
+            <a:effectRef idx="0">
+              <a:schemeClr val="accent1"/>
+            </a:effectRef>
+            <a:fontRef idx="minor">
+              <a:schemeClr val="lt1"/>
+            </a:fontRef>
+          </p:style>
+          <p:txBody>
+            <a:bodyPr rtlCol="0" anchor="ctr"/>
+            <a:lstStyle/>
+            <a:p>
+              <a:pPr algn="ctr"/>
+              <a:r>
+                <a:rPr lang="en-US" sz="2800" dirty="0" smtClean="0">
+                  <a:solidFill>
+                    <a:schemeClr val="tx1"/>
+                  </a:solidFill>
+                </a:rPr>
+                <a:t>IP</a:t>
+              </a:r>
+              <a:endParaRPr lang="en-US" sz="2800" dirty="0">
+                <a:solidFill>
+                  <a:schemeClr val="tx1"/>
+                </a:solidFill>
+              </a:endParaRPr>
+            </a:p>
+          </p:txBody>
+        </p:sp>
+        <p:sp>
+          <p:nvSpPr>
+            <p:cNvPr id="8" name="Rectangle 7"/>
+            <p:cNvSpPr/>
+            <p:nvPr/>
+          </p:nvSpPr>
+          <p:spPr>
+            <a:xfrm>
+              <a:off x="9102606" y="3462727"/>
+              <a:ext cx="1460357" cy="482120"/>
+            </a:xfrm>
+            <a:prstGeom prst="rect">
+              <a:avLst/>
+            </a:prstGeom>
+            <a:solidFill>
+              <a:srgbClr val="CFE7F1"/>
+            </a:solidFill>
+            <a:ln w="57150">
+              <a:solidFill>
+                <a:srgbClr val="00B0F0"/>
+              </a:solidFill>
+            </a:ln>
+          </p:spPr>
+          <p:style>
+            <a:lnRef idx="2">
+              <a:schemeClr val="accent1">
+                <a:shade val="50000"/>
+              </a:schemeClr>
+            </a:lnRef>
+            <a:fillRef idx="1">
+              <a:schemeClr val="accent1"/>
+            </a:fillRef>
+            <a:effectRef idx="0">
+              <a:schemeClr val="accent1"/>
+            </a:effectRef>
+            <a:fontRef idx="minor">
+              <a:schemeClr val="lt1"/>
+            </a:fontRef>
+          </p:style>
+          <p:txBody>
+            <a:bodyPr rtlCol="0" anchor="ctr"/>
+            <a:lstStyle/>
+            <a:p>
+              <a:pPr algn="ctr"/>
+              <a:r>
+                <a:rPr lang="en-US" sz="2800" dirty="0" smtClean="0">
+                  <a:solidFill>
+                    <a:schemeClr val="tx1"/>
+                  </a:solidFill>
+                </a:rPr>
+                <a:t>TCP</a:t>
+              </a:r>
+              <a:endParaRPr lang="en-US" sz="2800" dirty="0">
+                <a:solidFill>
+                  <a:schemeClr val="tx1"/>
+                </a:solidFill>
+              </a:endParaRPr>
+            </a:p>
+          </p:txBody>
+        </p:sp>
+        <p:sp>
+          <p:nvSpPr>
+            <p:cNvPr id="9" name="Rectangle 8"/>
+            <p:cNvSpPr/>
+            <p:nvPr/>
+          </p:nvSpPr>
+          <p:spPr>
+            <a:xfrm>
+              <a:off x="9102606" y="2980607"/>
+              <a:ext cx="1454647" cy="482120"/>
+            </a:xfrm>
+            <a:prstGeom prst="rect">
+              <a:avLst/>
+            </a:prstGeom>
+            <a:solidFill>
+              <a:srgbClr val="CFE7F1"/>
+            </a:solidFill>
+            <a:ln w="57150">
+              <a:solidFill>
+                <a:srgbClr val="00B0F0"/>
+              </a:solidFill>
+            </a:ln>
+          </p:spPr>
+          <p:style>
+            <a:lnRef idx="2">
+              <a:schemeClr val="accent1">
+                <a:shade val="50000"/>
+              </a:schemeClr>
+            </a:lnRef>
+            <a:fillRef idx="1">
+              <a:schemeClr val="accent1"/>
+            </a:fillRef>
+            <a:effectRef idx="0">
+              <a:schemeClr val="accent1"/>
+            </a:effectRef>
+            <a:fontRef idx="minor">
+              <a:schemeClr val="lt1"/>
+            </a:fontRef>
+          </p:style>
+          <p:txBody>
+            <a:bodyPr rtlCol="0" anchor="ctr"/>
+            <a:lstStyle/>
+            <a:p>
+              <a:pPr algn="ctr"/>
+              <a:r>
+                <a:rPr lang="en-US" sz="2800" dirty="0" smtClean="0">
+                  <a:solidFill>
+                    <a:schemeClr val="tx1"/>
+                  </a:solidFill>
+                </a:rPr>
+                <a:t>TLS</a:t>
+              </a:r>
+              <a:endParaRPr lang="en-US" sz="2800" dirty="0">
+                <a:solidFill>
+                  <a:schemeClr val="tx1"/>
+                </a:solidFill>
+              </a:endParaRPr>
+            </a:p>
+          </p:txBody>
+        </p:sp>
+        <p:sp>
+          <p:nvSpPr>
+            <p:cNvPr id="10" name="Rectangle 9"/>
+            <p:cNvSpPr/>
+            <p:nvPr/>
+          </p:nvSpPr>
+          <p:spPr>
+            <a:xfrm>
+              <a:off x="9102606" y="2498140"/>
+              <a:ext cx="1454647" cy="482120"/>
+            </a:xfrm>
+            <a:prstGeom prst="rect">
+              <a:avLst/>
+            </a:prstGeom>
+            <a:solidFill>
+              <a:srgbClr val="CFE7F1"/>
+            </a:solidFill>
+            <a:ln w="57150">
+              <a:solidFill>
+                <a:srgbClr val="00B0F0"/>
+              </a:solidFill>
+            </a:ln>
+          </p:spPr>
+          <p:style>
+            <a:lnRef idx="2">
+              <a:schemeClr val="accent1">
+                <a:shade val="50000"/>
+              </a:schemeClr>
+            </a:lnRef>
+            <a:fillRef idx="1">
+              <a:schemeClr val="accent1"/>
+            </a:fillRef>
+            <a:effectRef idx="0">
+              <a:schemeClr val="accent1"/>
+            </a:effectRef>
+            <a:fontRef idx="minor">
+              <a:schemeClr val="lt1"/>
+            </a:fontRef>
+          </p:style>
+          <p:txBody>
+            <a:bodyPr rtlCol="0" anchor="ctr"/>
+            <a:lstStyle/>
+            <a:p>
+              <a:pPr algn="ctr"/>
+              <a:r>
+                <a:rPr lang="en-US" sz="2800" dirty="0" smtClean="0">
+                  <a:solidFill>
+                    <a:schemeClr val="tx1"/>
+                  </a:solidFill>
+                </a:rPr>
+                <a:t>HTTP</a:t>
+              </a:r>
+              <a:endParaRPr lang="en-US" sz="2800" dirty="0">
+                <a:solidFill>
+                  <a:schemeClr val="tx1"/>
+                </a:solidFill>
+              </a:endParaRPr>
+            </a:p>
+          </p:txBody>
+        </p:sp>
+        <p:cxnSp>
+          <p:nvCxnSpPr>
+            <p:cNvPr id="11" name="Straight Connector 10"/>
+            <p:cNvCxnSpPr/>
+            <p:nvPr/>
+          </p:nvCxnSpPr>
+          <p:spPr>
+            <a:xfrm flipH="1" flipV="1">
+              <a:off x="8255984" y="1981771"/>
+              <a:ext cx="849478" cy="516372"/>
+            </a:xfrm>
+            <a:prstGeom prst="line">
+              <a:avLst/>
+            </a:prstGeom>
+            <a:ln w="28575">
+              <a:solidFill>
+                <a:srgbClr val="00B0F0"/>
+              </a:solidFill>
+            </a:ln>
+          </p:spPr>
+          <p:style>
+            <a:lnRef idx="1">
+              <a:schemeClr val="accent1"/>
+            </a:lnRef>
+            <a:fillRef idx="0">
+              <a:schemeClr val="accent1"/>
+            </a:fillRef>
+            <a:effectRef idx="0">
+              <a:schemeClr val="accent1"/>
+            </a:effectRef>
+            <a:fontRef idx="minor">
+              <a:schemeClr val="tx1"/>
+            </a:fontRef>
+          </p:style>
+        </p:cxnSp>
+        <p:cxnSp>
+          <p:nvCxnSpPr>
+            <p:cNvPr id="12" name="Straight Connector 11"/>
+            <p:cNvCxnSpPr/>
+            <p:nvPr/>
+          </p:nvCxnSpPr>
+          <p:spPr>
+            <a:xfrm flipV="1">
+              <a:off x="10557253" y="1999499"/>
+              <a:ext cx="754760" cy="498641"/>
+            </a:xfrm>
+            <a:prstGeom prst="line">
+              <a:avLst/>
+            </a:prstGeom>
+            <a:ln w="28575">
+              <a:solidFill>
+                <a:srgbClr val="00B0F0"/>
+              </a:solidFill>
+            </a:ln>
+          </p:spPr>
+          <p:style>
+            <a:lnRef idx="1">
+              <a:schemeClr val="accent1"/>
+            </a:lnRef>
+            <a:fillRef idx="0">
+              <a:schemeClr val="accent1"/>
+            </a:fillRef>
+            <a:effectRef idx="0">
+              <a:schemeClr val="accent1"/>
+            </a:effectRef>
+            <a:fontRef idx="minor">
+              <a:schemeClr val="tx1"/>
+            </a:fontRef>
+          </p:style>
+        </p:cxnSp>
+        <p:cxnSp>
+          <p:nvCxnSpPr>
+            <p:cNvPr id="13" name="Straight Connector 12"/>
+            <p:cNvCxnSpPr/>
+            <p:nvPr/>
+          </p:nvCxnSpPr>
+          <p:spPr>
+            <a:xfrm flipH="1">
+              <a:off x="8081851" y="4442062"/>
+              <a:ext cx="1020757" cy="681349"/>
+            </a:xfrm>
+            <a:prstGeom prst="line">
+              <a:avLst/>
+            </a:prstGeom>
+            <a:ln w="28575">
+              <a:solidFill>
+                <a:srgbClr val="00B0F0"/>
+              </a:solidFill>
+            </a:ln>
+          </p:spPr>
+          <p:style>
+            <a:lnRef idx="1">
+              <a:schemeClr val="accent1"/>
+            </a:lnRef>
+            <a:fillRef idx="0">
+              <a:schemeClr val="accent1"/>
+            </a:fillRef>
+            <a:effectRef idx="0">
+              <a:schemeClr val="accent1"/>
+            </a:effectRef>
+            <a:fontRef idx="minor">
+              <a:schemeClr val="tx1"/>
+            </a:fontRef>
+          </p:style>
+        </p:cxnSp>
+        <p:cxnSp>
+          <p:nvCxnSpPr>
+            <p:cNvPr id="14" name="Straight Connector 13"/>
+            <p:cNvCxnSpPr/>
+            <p:nvPr/>
+          </p:nvCxnSpPr>
+          <p:spPr>
+            <a:xfrm>
+              <a:off x="10557253" y="4442062"/>
+              <a:ext cx="754760" cy="497215"/>
+            </a:xfrm>
+            <a:prstGeom prst="line">
+              <a:avLst/>
+            </a:prstGeom>
+            <a:ln w="28575">
+              <a:solidFill>
+                <a:srgbClr val="00B0F0"/>
+              </a:solidFill>
+            </a:ln>
+          </p:spPr>
+          <p:style>
+            <a:lnRef idx="1">
+              <a:schemeClr val="accent1"/>
+            </a:lnRef>
+            <a:fillRef idx="0">
+              <a:schemeClr val="accent1"/>
+            </a:fillRef>
+            <a:effectRef idx="0">
+              <a:schemeClr val="accent1"/>
+            </a:effectRef>
+            <a:fontRef idx="minor">
+              <a:schemeClr val="tx1"/>
+            </a:fontRef>
+          </p:style>
+        </p:cxnSp>
+        <p:sp>
+          <p:nvSpPr>
+            <p:cNvPr id="15" name="Rounded Rectangle 14"/>
+            <p:cNvSpPr/>
+            <p:nvPr/>
+          </p:nvSpPr>
+          <p:spPr>
+            <a:xfrm>
+              <a:off x="8038000" y="4943683"/>
+              <a:ext cx="3583858" cy="677739"/>
+            </a:xfrm>
+            <a:prstGeom prst="roundRect">
+              <a:avLst>
+                <a:gd name="adj" fmla="val 50000"/>
+              </a:avLst>
+            </a:prstGeom>
+            <a:ln w="28575"/>
+          </p:spPr>
+          <p:style>
+            <a:lnRef idx="2">
+              <a:schemeClr val="dk1"/>
+            </a:lnRef>
+            <a:fillRef idx="1">
+              <a:schemeClr val="lt1"/>
+            </a:fillRef>
+            <a:effectRef idx="0">
+              <a:schemeClr val="dk1"/>
+            </a:effectRef>
+            <a:fontRef idx="minor">
+              <a:schemeClr val="dk1"/>
+            </a:fontRef>
+          </p:style>
+          <p:txBody>
+            <a:bodyPr rtlCol="0" anchor="ctr"/>
+            <a:lstStyle/>
+            <a:p>
+              <a:pPr algn="ctr"/>
+              <a:r>
+                <a:rPr lang="en-US" sz="2800" dirty="0" smtClean="0"/>
+                <a:t>Networks</a:t>
+              </a:r>
+              <a:endParaRPr lang="en-US" sz="2800" dirty="0"/>
+            </a:p>
+          </p:txBody>
+        </p:sp>
+        <p:sp>
+          <p:nvSpPr>
+            <p:cNvPr id="16" name="Rounded Rectangle 15"/>
+            <p:cNvSpPr/>
+            <p:nvPr/>
+          </p:nvSpPr>
+          <p:spPr>
+            <a:xfrm>
+              <a:off x="8040856" y="1321760"/>
+              <a:ext cx="3583858" cy="677739"/>
+            </a:xfrm>
+            <a:prstGeom prst="roundRect">
+              <a:avLst>
+                <a:gd name="adj" fmla="val 50000"/>
+              </a:avLst>
+            </a:prstGeom>
+            <a:ln w="28575"/>
+          </p:spPr>
+          <p:style>
+            <a:lnRef idx="2">
+              <a:schemeClr val="dk1"/>
+            </a:lnRef>
+            <a:fillRef idx="1">
+              <a:schemeClr val="lt1"/>
+            </a:fillRef>
+            <a:effectRef idx="0">
+              <a:schemeClr val="dk1"/>
+            </a:effectRef>
+            <a:fontRef idx="minor">
+              <a:schemeClr val="dk1"/>
+            </a:fontRef>
+          </p:style>
+          <p:txBody>
+            <a:bodyPr rtlCol="0" anchor="ctr"/>
+            <a:lstStyle/>
+            <a:p>
+              <a:pPr algn="ctr"/>
+              <a:r>
+                <a:rPr lang="en-US" sz="2800" dirty="0" smtClean="0"/>
+                <a:t>Applications</a:t>
+              </a:r>
+              <a:endParaRPr lang="en-US" sz="2800" dirty="0"/>
+            </a:p>
+          </p:txBody>
+        </p:sp>
+      </p:grpSp>
+      <p:grpSp>
+        <p:nvGrpSpPr>
+          <p:cNvPr id="43" name="Group 42"/>
+          <p:cNvGrpSpPr/>
+          <p:nvPr/>
+        </p:nvGrpSpPr>
+        <p:grpSpPr>
+          <a:xfrm>
+            <a:off x="5506893" y="2753499"/>
+            <a:ext cx="1178215" cy="1463199"/>
+            <a:chOff x="6715710" y="2753499"/>
+            <a:chExt cx="1178215" cy="1463199"/>
+          </a:xfrm>
+        </p:grpSpPr>
+        <p:sp>
+          <p:nvSpPr>
+            <p:cNvPr id="17" name="Right Arrow 16"/>
+            <p:cNvSpPr/>
+            <p:nvPr/>
+          </p:nvSpPr>
+          <p:spPr>
+            <a:xfrm>
+              <a:off x="6719233" y="3230531"/>
+              <a:ext cx="1174692" cy="482120"/>
+            </a:xfrm>
+            <a:prstGeom prst="rightArrow">
+              <a:avLst/>
+            </a:prstGeom>
+          </p:spPr>
+          <p:style>
+            <a:lnRef idx="2">
+              <a:schemeClr val="accent1">
+                <a:shade val="50000"/>
+              </a:schemeClr>
+            </a:lnRef>
+            <a:fillRef idx="1">
+              <a:schemeClr val="accent1"/>
+            </a:fillRef>
+            <a:effectRef idx="0">
+              <a:schemeClr val="accent1"/>
+            </a:effectRef>
+            <a:fontRef idx="minor">
+              <a:schemeClr val="lt1"/>
+            </a:fontRef>
+          </p:style>
+          <p:txBody>
+            <a:bodyPr rtlCol="0" anchor="ctr"/>
+            <a:lstStyle/>
+            <a:p>
+              <a:pPr algn="ctr"/>
+              <a:endParaRPr lang="en-US"/>
+            </a:p>
+          </p:txBody>
+        </p:sp>
+        <p:sp>
+          <p:nvSpPr>
+            <p:cNvPr id="18" name="TextBox 17"/>
+            <p:cNvSpPr txBox="1"/>
+            <p:nvPr/>
+          </p:nvSpPr>
+          <p:spPr>
+            <a:xfrm>
+              <a:off x="6715710" y="2753499"/>
+              <a:ext cx="1063753" cy="646331"/>
+            </a:xfrm>
+            <a:prstGeom prst="rect">
+              <a:avLst/>
+            </a:prstGeom>
+            <a:noFill/>
+          </p:spPr>
+          <p:txBody>
+            <a:bodyPr wrap="none" rtlCol="0">
+              <a:spAutoFit/>
+            </a:bodyPr>
+            <a:lstStyle/>
+            <a:p>
+              <a:pPr algn="ctr"/>
+              <a:r>
+                <a:rPr lang="en-US" dirty="0" smtClean="0"/>
+                <a:t>Evolution</a:t>
+              </a:r>
+            </a:p>
+            <a:p>
+              <a:pPr algn="ctr"/>
+              <a:r>
+                <a:rPr lang="en-US" dirty="0"/>
+                <a:t>o</a:t>
+              </a:r>
+              <a:r>
+                <a:rPr lang="en-US" dirty="0" smtClean="0"/>
+                <a:t>f the </a:t>
+              </a:r>
+              <a:endParaRPr lang="en-US" dirty="0"/>
+            </a:p>
+          </p:txBody>
+        </p:sp>
+        <p:sp>
+          <p:nvSpPr>
+            <p:cNvPr id="19" name="TextBox 18"/>
+            <p:cNvSpPr txBox="1"/>
+            <p:nvPr/>
+          </p:nvSpPr>
+          <p:spPr>
+            <a:xfrm>
+              <a:off x="6804004" y="3570367"/>
+              <a:ext cx="887166" cy="646331"/>
+            </a:xfrm>
+            <a:prstGeom prst="rect">
+              <a:avLst/>
+            </a:prstGeom>
+            <a:noFill/>
+          </p:spPr>
+          <p:txBody>
+            <a:bodyPr wrap="none" rtlCol="0">
+              <a:spAutoFit/>
+            </a:bodyPr>
+            <a:lstStyle/>
+            <a:p>
+              <a:pPr algn="ctr"/>
+              <a:r>
+                <a:rPr lang="en-US" dirty="0" smtClean="0"/>
+                <a:t>Narrow</a:t>
+              </a:r>
+            </a:p>
+            <a:p>
+              <a:pPr algn="ctr"/>
+              <a:r>
+                <a:rPr lang="en-US" dirty="0" smtClean="0"/>
+                <a:t>Waist </a:t>
+              </a:r>
+              <a:endParaRPr lang="en-US" dirty="0"/>
+            </a:p>
+          </p:txBody>
+        </p:sp>
+      </p:grpSp>
+      <p:grpSp>
+        <p:nvGrpSpPr>
+          <p:cNvPr id="45" name="Group 44"/>
+          <p:cNvGrpSpPr/>
+          <p:nvPr/>
+        </p:nvGrpSpPr>
+        <p:grpSpPr>
+          <a:xfrm>
+            <a:off x="1359574" y="1324047"/>
+            <a:ext cx="4193228" cy="4299661"/>
+            <a:chOff x="1325520" y="1321760"/>
+            <a:chExt cx="4193228" cy="4299661"/>
+          </a:xfrm>
+        </p:grpSpPr>
+        <p:sp>
+          <p:nvSpPr>
+            <p:cNvPr id="35" name="Rectangle 34"/>
+            <p:cNvSpPr/>
+            <p:nvPr/>
+          </p:nvSpPr>
+          <p:spPr>
+            <a:xfrm>
+              <a:off x="2570152" y="2980259"/>
+              <a:ext cx="1700627" cy="963160"/>
+            </a:xfrm>
+            <a:prstGeom prst="rect">
+              <a:avLst/>
+            </a:prstGeom>
+            <a:solidFill>
+              <a:srgbClr val="CFE7F1"/>
+            </a:solidFill>
+            <a:ln w="57150">
+              <a:solidFill>
+                <a:srgbClr val="00B0F0"/>
+              </a:solidFill>
+            </a:ln>
+          </p:spPr>
+          <p:style>
+            <a:lnRef idx="2">
+              <a:schemeClr val="accent1">
+                <a:shade val="50000"/>
+              </a:schemeClr>
+            </a:lnRef>
+            <a:fillRef idx="1">
+              <a:schemeClr val="accent1"/>
+            </a:fillRef>
+            <a:effectRef idx="0">
+              <a:schemeClr val="accent1"/>
+            </a:effectRef>
+            <a:fontRef idx="minor">
+              <a:schemeClr val="lt1"/>
+            </a:fontRef>
+          </p:style>
+          <p:txBody>
+            <a:bodyPr rtlCol="0" anchor="ctr"/>
+            <a:lstStyle/>
+            <a:p>
+              <a:pPr algn="ctr"/>
+              <a:r>
+                <a:rPr lang="en-US" sz="2800" dirty="0" smtClean="0">
+                  <a:solidFill>
+                    <a:schemeClr val="tx1"/>
+                  </a:solidFill>
+                </a:rPr>
+                <a:t>IP</a:t>
+              </a:r>
+              <a:endParaRPr lang="en-US" sz="2800" dirty="0">
+                <a:solidFill>
+                  <a:schemeClr val="tx1"/>
+                </a:solidFill>
+              </a:endParaRPr>
+            </a:p>
+          </p:txBody>
+        </p:sp>
+        <p:cxnSp>
+          <p:nvCxnSpPr>
+            <p:cNvPr id="36" name="Straight Connector 35"/>
+            <p:cNvCxnSpPr/>
+            <p:nvPr/>
+          </p:nvCxnSpPr>
+          <p:spPr>
+            <a:xfrm flipH="1" flipV="1">
+              <a:off x="1580367" y="1981771"/>
+              <a:ext cx="989785" cy="1017992"/>
+            </a:xfrm>
+            <a:prstGeom prst="line">
+              <a:avLst/>
+            </a:prstGeom>
+            <a:ln w="28575">
+              <a:solidFill>
+                <a:srgbClr val="00B0F0"/>
+              </a:solidFill>
+            </a:ln>
+          </p:spPr>
+          <p:style>
+            <a:lnRef idx="1">
+              <a:schemeClr val="accent1"/>
+            </a:lnRef>
+            <a:fillRef idx="0">
+              <a:schemeClr val="accent1"/>
+            </a:fillRef>
+            <a:effectRef idx="0">
+              <a:schemeClr val="accent1"/>
+            </a:effectRef>
+            <a:fontRef idx="minor">
+              <a:schemeClr val="tx1"/>
+            </a:fontRef>
+          </p:style>
+        </p:cxnSp>
+        <p:cxnSp>
+          <p:nvCxnSpPr>
+            <p:cNvPr id="37" name="Straight Connector 36"/>
+            <p:cNvCxnSpPr/>
+            <p:nvPr/>
+          </p:nvCxnSpPr>
+          <p:spPr>
+            <a:xfrm flipV="1">
+              <a:off x="4270779" y="1999500"/>
+              <a:ext cx="882390" cy="976352"/>
+            </a:xfrm>
+            <a:prstGeom prst="line">
+              <a:avLst/>
+            </a:prstGeom>
+            <a:ln w="28575">
+              <a:solidFill>
+                <a:srgbClr val="00B0F0"/>
+              </a:solidFill>
+            </a:ln>
+          </p:spPr>
+          <p:style>
+            <a:lnRef idx="1">
+              <a:schemeClr val="accent1"/>
+            </a:lnRef>
+            <a:fillRef idx="0">
+              <a:schemeClr val="accent1"/>
+            </a:fillRef>
+            <a:effectRef idx="0">
+              <a:schemeClr val="accent1"/>
+            </a:effectRef>
+            <a:fontRef idx="minor">
+              <a:schemeClr val="tx1"/>
+            </a:fontRef>
+          </p:style>
+        </p:cxnSp>
+        <p:cxnSp>
+          <p:nvCxnSpPr>
+            <p:cNvPr id="38" name="Straight Connector 37"/>
+            <p:cNvCxnSpPr/>
+            <p:nvPr/>
+          </p:nvCxnSpPr>
+          <p:spPr>
+            <a:xfrm flipH="1">
+              <a:off x="1376787" y="3943418"/>
+              <a:ext cx="1193364" cy="1179992"/>
+            </a:xfrm>
+            <a:prstGeom prst="line">
+              <a:avLst/>
+            </a:prstGeom>
+            <a:ln w="28575">
+              <a:solidFill>
+                <a:srgbClr val="00B0F0"/>
+              </a:solidFill>
+            </a:ln>
+          </p:spPr>
+          <p:style>
+            <a:lnRef idx="1">
+              <a:schemeClr val="accent1"/>
+            </a:lnRef>
+            <a:fillRef idx="0">
+              <a:schemeClr val="accent1"/>
+            </a:fillRef>
+            <a:effectRef idx="0">
+              <a:schemeClr val="accent1"/>
+            </a:effectRef>
+            <a:fontRef idx="minor">
+              <a:schemeClr val="tx1"/>
+            </a:fontRef>
+          </p:style>
+        </p:cxnSp>
+        <p:cxnSp>
+          <p:nvCxnSpPr>
+            <p:cNvPr id="39" name="Straight Connector 38"/>
+            <p:cNvCxnSpPr/>
+            <p:nvPr/>
+          </p:nvCxnSpPr>
+          <p:spPr>
+            <a:xfrm>
+              <a:off x="4270779" y="3967329"/>
+              <a:ext cx="882390" cy="971947"/>
+            </a:xfrm>
+            <a:prstGeom prst="line">
+              <a:avLst/>
+            </a:prstGeom>
+            <a:ln w="28575">
+              <a:solidFill>
+                <a:srgbClr val="00B0F0"/>
+              </a:solidFill>
+            </a:ln>
+          </p:spPr>
+          <p:style>
+            <a:lnRef idx="1">
+              <a:schemeClr val="accent1"/>
+            </a:lnRef>
+            <a:fillRef idx="0">
+              <a:schemeClr val="accent1"/>
+            </a:fillRef>
+            <a:effectRef idx="0">
+              <a:schemeClr val="accent1"/>
+            </a:effectRef>
+            <a:fontRef idx="minor">
+              <a:schemeClr val="tx1"/>
+            </a:fontRef>
+          </p:style>
+        </p:cxnSp>
+        <p:sp>
+          <p:nvSpPr>
+            <p:cNvPr id="40" name="Rounded Rectangle 39"/>
+            <p:cNvSpPr/>
+            <p:nvPr/>
+          </p:nvSpPr>
+          <p:spPr>
+            <a:xfrm>
+              <a:off x="1325520" y="4943682"/>
+              <a:ext cx="4189889" cy="677739"/>
+            </a:xfrm>
+            <a:prstGeom prst="roundRect">
+              <a:avLst>
+                <a:gd name="adj" fmla="val 50000"/>
+              </a:avLst>
+            </a:prstGeom>
+            <a:ln w="28575"/>
+          </p:spPr>
+          <p:style>
+            <a:lnRef idx="2">
+              <a:schemeClr val="dk1"/>
+            </a:lnRef>
+            <a:fillRef idx="1">
+              <a:schemeClr val="lt1"/>
+            </a:fillRef>
+            <a:effectRef idx="0">
+              <a:schemeClr val="dk1"/>
+            </a:effectRef>
+            <a:fontRef idx="minor">
+              <a:schemeClr val="dk1"/>
+            </a:fontRef>
+          </p:style>
+          <p:txBody>
+            <a:bodyPr rtlCol="0" anchor="ctr"/>
+            <a:lstStyle/>
+            <a:p>
+              <a:pPr algn="ctr"/>
+              <a:r>
+                <a:rPr lang="en-US" sz="2800" dirty="0" smtClean="0"/>
+                <a:t>Networks</a:t>
+              </a:r>
+              <a:endParaRPr lang="en-US" sz="2800" dirty="0"/>
+            </a:p>
+          </p:txBody>
+        </p:sp>
+        <p:sp>
+          <p:nvSpPr>
+            <p:cNvPr id="41" name="Rounded Rectangle 40"/>
+            <p:cNvSpPr/>
+            <p:nvPr/>
+          </p:nvSpPr>
+          <p:spPr>
+            <a:xfrm>
+              <a:off x="1328859" y="1321760"/>
+              <a:ext cx="4189889" cy="677739"/>
+            </a:xfrm>
+            <a:prstGeom prst="roundRect">
+              <a:avLst>
+                <a:gd name="adj" fmla="val 50000"/>
+              </a:avLst>
+            </a:prstGeom>
+            <a:ln w="28575"/>
+          </p:spPr>
+          <p:style>
+            <a:lnRef idx="2">
+              <a:schemeClr val="dk1"/>
+            </a:lnRef>
+            <a:fillRef idx="1">
+              <a:schemeClr val="lt1"/>
+            </a:fillRef>
+            <a:effectRef idx="0">
+              <a:schemeClr val="dk1"/>
+            </a:effectRef>
+            <a:fontRef idx="minor">
+              <a:schemeClr val="dk1"/>
+            </a:fontRef>
+          </p:style>
+          <p:txBody>
+            <a:bodyPr rtlCol="0" anchor="ctr"/>
+            <a:lstStyle/>
+            <a:p>
+              <a:pPr algn="ctr"/>
+              <a:r>
+                <a:rPr lang="en-US" sz="2800" dirty="0" smtClean="0"/>
+                <a:t>Applications</a:t>
+              </a:r>
+              <a:endParaRPr lang="en-US" sz="2800" dirty="0"/>
+            </a:p>
+          </p:txBody>
+        </p:sp>
+      </p:grpSp>
+    </p:spTree>
+    <p:extLst>
+      <p:ext uri="{BB962C8B-B14F-4D97-AF65-F5344CB8AC3E}">
+        <p14:creationId xmlns:p14="http://schemas.microsoft.com/office/powerpoint/2010/main" val="469766703"/>
+      </p:ext>
+    </p:extLst>
+  </p:cSld>
+  <p:clrMapOvr>
+    <a:masterClrMapping/>
+  </p:clrMapOvr>
 </p:sld>
 </file>
 

</xml_diff>